<commit_message>
scale up/down,load balance, comparison,etc.. version 0
</commit_message>
<xml_diff>
--- a/README/CloudSimReport.pptx
+++ b/README/CloudSimReport.pptx
@@ -207,7 +207,7 @@
           <a:p>
             <a:fld id="{2DDEE0BD-05D1-4674-8625-FC6116BF821B}" type="datetimeFigureOut">
               <a:rPr lang="zh-CN" altLang="en-US" smtClean="0"/>
-              <a:t>2021/3/10</a:t>
+              <a:t>2021/4/30</a:t>
             </a:fld>
             <a:endParaRPr lang="zh-CN" altLang="en-US"/>
           </a:p>
@@ -964,7 +964,7 @@
           <a:p>
             <a:fld id="{E8D272B3-2C5A-4019-9C46-8F61D4296E59}" type="datetimeFigureOut">
               <a:rPr lang="zh-CN" altLang="en-US" smtClean="0"/>
-              <a:t>2021/3/10</a:t>
+              <a:t>2021/4/30</a:t>
             </a:fld>
             <a:endParaRPr lang="zh-CN" altLang="en-US"/>
           </a:p>
@@ -1162,7 +1162,7 @@
           <a:p>
             <a:fld id="{E8D272B3-2C5A-4019-9C46-8F61D4296E59}" type="datetimeFigureOut">
               <a:rPr lang="zh-CN" altLang="en-US" smtClean="0"/>
-              <a:t>2021/3/10</a:t>
+              <a:t>2021/4/30</a:t>
             </a:fld>
             <a:endParaRPr lang="zh-CN" altLang="en-US"/>
           </a:p>
@@ -1370,7 +1370,7 @@
           <a:p>
             <a:fld id="{E8D272B3-2C5A-4019-9C46-8F61D4296E59}" type="datetimeFigureOut">
               <a:rPr lang="zh-CN" altLang="en-US" smtClean="0"/>
-              <a:t>2021/3/10</a:t>
+              <a:t>2021/4/30</a:t>
             </a:fld>
             <a:endParaRPr lang="zh-CN" altLang="en-US"/>
           </a:p>
@@ -1568,7 +1568,7 @@
           <a:p>
             <a:fld id="{E8D272B3-2C5A-4019-9C46-8F61D4296E59}" type="datetimeFigureOut">
               <a:rPr lang="zh-CN" altLang="en-US" smtClean="0"/>
-              <a:t>2021/3/10</a:t>
+              <a:t>2021/4/30</a:t>
             </a:fld>
             <a:endParaRPr lang="zh-CN" altLang="en-US"/>
           </a:p>
@@ -1843,7 +1843,7 @@
           <a:p>
             <a:fld id="{E8D272B3-2C5A-4019-9C46-8F61D4296E59}" type="datetimeFigureOut">
               <a:rPr lang="zh-CN" altLang="en-US" smtClean="0"/>
-              <a:t>2021/3/10</a:t>
+              <a:t>2021/4/30</a:t>
             </a:fld>
             <a:endParaRPr lang="zh-CN" altLang="en-US"/>
           </a:p>
@@ -2108,7 +2108,7 @@
           <a:p>
             <a:fld id="{E8D272B3-2C5A-4019-9C46-8F61D4296E59}" type="datetimeFigureOut">
               <a:rPr lang="zh-CN" altLang="en-US" smtClean="0"/>
-              <a:t>2021/3/10</a:t>
+              <a:t>2021/4/30</a:t>
             </a:fld>
             <a:endParaRPr lang="zh-CN" altLang="en-US"/>
           </a:p>
@@ -2520,7 +2520,7 @@
           <a:p>
             <a:fld id="{E8D272B3-2C5A-4019-9C46-8F61D4296E59}" type="datetimeFigureOut">
               <a:rPr lang="zh-CN" altLang="en-US" smtClean="0"/>
-              <a:t>2021/3/10</a:t>
+              <a:t>2021/4/30</a:t>
             </a:fld>
             <a:endParaRPr lang="zh-CN" altLang="en-US"/>
           </a:p>
@@ -2661,7 +2661,7 @@
           <a:p>
             <a:fld id="{E8D272B3-2C5A-4019-9C46-8F61D4296E59}" type="datetimeFigureOut">
               <a:rPr lang="zh-CN" altLang="en-US" smtClean="0"/>
-              <a:t>2021/3/10</a:t>
+              <a:t>2021/4/30</a:t>
             </a:fld>
             <a:endParaRPr lang="zh-CN" altLang="en-US"/>
           </a:p>
@@ -2774,7 +2774,7 @@
           <a:p>
             <a:fld id="{E8D272B3-2C5A-4019-9C46-8F61D4296E59}" type="datetimeFigureOut">
               <a:rPr lang="zh-CN" altLang="en-US" smtClean="0"/>
-              <a:t>2021/3/10</a:t>
+              <a:t>2021/4/30</a:t>
             </a:fld>
             <a:endParaRPr lang="zh-CN" altLang="en-US"/>
           </a:p>
@@ -3085,7 +3085,7 @@
           <a:p>
             <a:fld id="{E8D272B3-2C5A-4019-9C46-8F61D4296E59}" type="datetimeFigureOut">
               <a:rPr lang="zh-CN" altLang="en-US" smtClean="0"/>
-              <a:t>2021/3/10</a:t>
+              <a:t>2021/4/30</a:t>
             </a:fld>
             <a:endParaRPr lang="zh-CN" altLang="en-US"/>
           </a:p>
@@ -3373,7 +3373,7 @@
           <a:p>
             <a:fld id="{E8D272B3-2C5A-4019-9C46-8F61D4296E59}" type="datetimeFigureOut">
               <a:rPr lang="zh-CN" altLang="en-US" smtClean="0"/>
-              <a:t>2021/3/10</a:t>
+              <a:t>2021/4/30</a:t>
             </a:fld>
             <a:endParaRPr lang="zh-CN" altLang="en-US"/>
           </a:p>
@@ -3614,7 +3614,7 @@
           <a:p>
             <a:fld id="{E8D272B3-2C5A-4019-9C46-8F61D4296E59}" type="datetimeFigureOut">
               <a:rPr lang="zh-CN" altLang="en-US" smtClean="0"/>
-              <a:t>2021/3/10</a:t>
+              <a:t>2021/4/30</a:t>
             </a:fld>
             <a:endParaRPr lang="zh-CN" altLang="en-US"/>
           </a:p>
@@ -5547,6 +5547,7 @@
           <a:prstGeom prst="rect">
             <a:avLst/>
           </a:prstGeom>
+          <a:noFill/>
         </p:spPr>
         <p:style>
           <a:lnRef idx="2">
@@ -5569,7 +5570,11 @@
           <a:lstStyle/>
           <a:p>
             <a:pPr algn="ctr"/>
-            <a:endParaRPr lang="zh-CN" altLang="en-US" dirty="0"/>
+            <a:endParaRPr lang="zh-CN" altLang="en-US" dirty="0">
+              <a:solidFill>
+                <a:schemeClr val="tx1"/>
+              </a:solidFill>
+            </a:endParaRPr>
           </a:p>
         </p:txBody>
       </p:sp>
@@ -5593,6 +5598,7 @@
           <a:prstGeom prst="rect">
             <a:avLst/>
           </a:prstGeom>
+          <a:noFill/>
         </p:spPr>
         <p:style>
           <a:lnRef idx="2">
@@ -5642,6 +5648,12 @@
             <a:avLst/>
           </a:prstGeom>
           <a:ln w="57150">
+            <a:solidFill>
+              <a:schemeClr val="tx1">
+                <a:lumMod val="50000"/>
+                <a:lumOff val="50000"/>
+              </a:schemeClr>
+            </a:solidFill>
             <a:tailEnd type="triangle"/>
           </a:ln>
         </p:spPr>
@@ -5680,6 +5692,7 @@
           <a:prstGeom prst="ellipse">
             <a:avLst/>
           </a:prstGeom>
+          <a:noFill/>
         </p:spPr>
         <p:style>
           <a:lnRef idx="2">
@@ -5703,10 +5716,18 @@
           <a:p>
             <a:pPr algn="ctr"/>
             <a:r>
-              <a:rPr lang="en-US" altLang="zh-CN" dirty="0"/>
+              <a:rPr lang="en-US" altLang="zh-CN" dirty="0">
+                <a:solidFill>
+                  <a:schemeClr val="tx1"/>
+                </a:solidFill>
+              </a:rPr>
               <a:t>Datacenter A</a:t>
             </a:r>
-            <a:endParaRPr lang="zh-CN" altLang="en-US" dirty="0"/>
+            <a:endParaRPr lang="zh-CN" altLang="en-US" dirty="0">
+              <a:solidFill>
+                <a:schemeClr val="tx1"/>
+              </a:solidFill>
+            </a:endParaRPr>
           </a:p>
         </p:txBody>
       </p:sp>
@@ -5792,15 +5813,22 @@
           <a:lstStyle/>
           <a:p>
             <a:r>
-              <a:rPr lang="en-US" altLang="zh-CN" dirty="0">
+              <a:rPr lang="zh-CN" altLang="en-US" dirty="0">
                 <a:solidFill>
                   <a:srgbClr val="FF0000"/>
                 </a:solidFill>
                 <a:latin typeface="Calibri" panose="020F0502020204030204" pitchFamily="34" charset="0"/>
                 <a:cs typeface="Calibri" panose="020F0502020204030204" pitchFamily="34" charset="0"/>
               </a:rPr>
-              <a:t>Optimal Datacenter to locate presently</a:t>
-            </a:r>
+              <a:t>返回当前最适宜放置的数据中心</a:t>
+            </a:r>
+            <a:endParaRPr lang="en-US" altLang="zh-CN" dirty="0">
+              <a:solidFill>
+                <a:srgbClr val="FF0000"/>
+              </a:solidFill>
+              <a:latin typeface="Calibri" panose="020F0502020204030204" pitchFamily="34" charset="0"/>
+              <a:cs typeface="Calibri" panose="020F0502020204030204" pitchFamily="34" charset="0"/>
+            </a:endParaRPr>
           </a:p>
           <a:p>
             <a:r>
@@ -5837,12 +5865,13 @@
         </p:nvSpPr>
         <p:spPr>
           <a:xfrm>
-            <a:off x="1980159" y="776868"/>
+            <a:off x="1960594" y="814232"/>
             <a:ext cx="1045557" cy="710553"/>
           </a:xfrm>
           <a:prstGeom prst="ellipse">
             <a:avLst/>
           </a:prstGeom>
+          <a:noFill/>
         </p:spPr>
         <p:style>
           <a:lnRef idx="2">
@@ -5866,10 +5895,18 @@
           <a:p>
             <a:pPr algn="ctr"/>
             <a:r>
-              <a:rPr lang="en-US" altLang="zh-CN" dirty="0"/>
+              <a:rPr lang="en-US" altLang="zh-CN" dirty="0">
+                <a:solidFill>
+                  <a:schemeClr val="tx1"/>
+                </a:solidFill>
+              </a:rPr>
               <a:t>User</a:t>
             </a:r>
-            <a:endParaRPr lang="zh-CN" altLang="en-US" dirty="0"/>
+            <a:endParaRPr lang="zh-CN" altLang="en-US" dirty="0">
+              <a:solidFill>
+                <a:schemeClr val="tx1"/>
+              </a:solidFill>
+            </a:endParaRPr>
           </a:p>
         </p:txBody>
       </p:sp>
@@ -5893,6 +5930,7 @@
           <a:prstGeom prst="rect">
             <a:avLst/>
           </a:prstGeom>
+          <a:noFill/>
         </p:spPr>
         <p:style>
           <a:lnRef idx="2">
@@ -5915,7 +5953,11 @@
           <a:lstStyle/>
           <a:p>
             <a:pPr algn="ctr"/>
-            <a:endParaRPr lang="zh-CN" altLang="en-US" dirty="0"/>
+            <a:endParaRPr lang="zh-CN" altLang="en-US" dirty="0">
+              <a:solidFill>
+                <a:schemeClr val="tx1"/>
+              </a:solidFill>
+            </a:endParaRPr>
           </a:p>
         </p:txBody>
       </p:sp>
@@ -5939,6 +5981,7 @@
           <a:prstGeom prst="ellipse">
             <a:avLst/>
           </a:prstGeom>
+          <a:noFill/>
         </p:spPr>
         <p:style>
           <a:lnRef idx="2">
@@ -5962,10 +6005,18 @@
           <a:p>
             <a:pPr algn="ctr"/>
             <a:r>
-              <a:rPr lang="en-US" altLang="zh-CN" dirty="0"/>
+              <a:rPr lang="en-US" altLang="zh-CN" dirty="0">
+                <a:solidFill>
+                  <a:schemeClr val="tx1"/>
+                </a:solidFill>
+              </a:rPr>
               <a:t>B</a:t>
             </a:r>
-            <a:endParaRPr lang="zh-CN" altLang="en-US" dirty="0"/>
+            <a:endParaRPr lang="zh-CN" altLang="en-US" dirty="0">
+              <a:solidFill>
+                <a:schemeClr val="tx1"/>
+              </a:solidFill>
+            </a:endParaRPr>
           </a:p>
         </p:txBody>
       </p:sp>
@@ -5983,12 +6034,13 @@
         </p:nvSpPr>
         <p:spPr>
           <a:xfrm>
-            <a:off x="7426326" y="2737220"/>
-            <a:ext cx="1696713" cy="889245"/>
+            <a:off x="7426327" y="2737220"/>
+            <a:ext cx="1479866" cy="820483"/>
           </a:xfrm>
           <a:prstGeom prst="rect">
             <a:avLst/>
           </a:prstGeom>
+          <a:noFill/>
         </p:spPr>
         <p:style>
           <a:lnRef idx="2">
@@ -6011,7 +6063,11 @@
           <a:lstStyle/>
           <a:p>
             <a:pPr algn="ctr"/>
-            <a:endParaRPr lang="zh-CN" altLang="en-US" dirty="0"/>
+            <a:endParaRPr lang="zh-CN" altLang="en-US" dirty="0">
+              <a:solidFill>
+                <a:schemeClr val="tx1"/>
+              </a:solidFill>
+            </a:endParaRPr>
           </a:p>
         </p:txBody>
       </p:sp>
@@ -6035,6 +6091,7 @@
           <a:prstGeom prst="ellipse">
             <a:avLst/>
           </a:prstGeom>
+          <a:noFill/>
         </p:spPr>
         <p:style>
           <a:lnRef idx="2">
@@ -6058,10 +6115,18 @@
           <a:p>
             <a:pPr algn="ctr"/>
             <a:r>
-              <a:rPr lang="en-US" altLang="zh-CN" dirty="0"/>
+              <a:rPr lang="en-US" altLang="zh-CN" dirty="0">
+                <a:solidFill>
+                  <a:schemeClr val="tx1"/>
+                </a:solidFill>
+              </a:rPr>
               <a:t>C</a:t>
             </a:r>
-            <a:endParaRPr lang="zh-CN" altLang="en-US" dirty="0"/>
+            <a:endParaRPr lang="zh-CN" altLang="en-US" dirty="0">
+              <a:solidFill>
+                <a:schemeClr val="tx1"/>
+              </a:solidFill>
+            </a:endParaRPr>
           </a:p>
         </p:txBody>
       </p:sp>
@@ -6085,6 +6150,7 @@
           <a:prstGeom prst="ellipse">
             <a:avLst/>
           </a:prstGeom>
+          <a:noFill/>
         </p:spPr>
         <p:style>
           <a:lnRef idx="2">
@@ -6108,10 +6174,18 @@
           <a:p>
             <a:pPr algn="ctr"/>
             <a:r>
-              <a:rPr lang="en-US" altLang="zh-CN" dirty="0"/>
+              <a:rPr lang="en-US" altLang="zh-CN" dirty="0">
+                <a:solidFill>
+                  <a:schemeClr val="tx1"/>
+                </a:solidFill>
+              </a:rPr>
               <a:t>broker</a:t>
             </a:r>
-            <a:endParaRPr lang="zh-CN" altLang="en-US" dirty="0"/>
+            <a:endParaRPr lang="zh-CN" altLang="en-US" dirty="0">
+              <a:solidFill>
+                <a:schemeClr val="tx1"/>
+              </a:solidFill>
+            </a:endParaRPr>
           </a:p>
         </p:txBody>
       </p:sp>
@@ -6137,26 +6211,25 @@
           <a:prstGeom prst="straightConnector1">
             <a:avLst/>
           </a:prstGeom>
-          <a:ln w="57150">
+          <a:ln w="9525" cap="flat" cmpd="sng" algn="ctr">
             <a:solidFill>
-              <a:schemeClr val="tx1">
-                <a:lumMod val="50000"/>
-                <a:lumOff val="50000"/>
-              </a:schemeClr>
+              <a:schemeClr val="dk1"/>
             </a:solidFill>
-            <a:prstDash val="sysDot"/>
-            <a:tailEnd type="triangle"/>
+            <a:prstDash val="solid"/>
+            <a:round/>
+            <a:headEnd type="none" w="med" len="med"/>
+            <a:tailEnd type="arrow" w="med" len="med"/>
           </a:ln>
         </p:spPr>
         <p:style>
-          <a:lnRef idx="1">
-            <a:schemeClr val="accent1"/>
+          <a:lnRef idx="0">
+            <a:scrgbClr r="0" g="0" b="0"/>
           </a:lnRef>
           <a:fillRef idx="0">
-            <a:schemeClr val="accent1"/>
+            <a:scrgbClr r="0" g="0" b="0"/>
           </a:fillRef>
           <a:effectRef idx="0">
-            <a:schemeClr val="accent1"/>
+            <a:scrgbClr r="0" g="0" b="0"/>
           </a:effectRef>
           <a:fontRef idx="minor">
             <a:schemeClr val="tx1"/>
@@ -6185,26 +6258,25 @@
           <a:prstGeom prst="straightConnector1">
             <a:avLst/>
           </a:prstGeom>
-          <a:ln w="57150">
+          <a:ln w="9525" cap="flat" cmpd="sng" algn="ctr">
             <a:solidFill>
-              <a:schemeClr val="tx1">
-                <a:lumMod val="50000"/>
-                <a:lumOff val="50000"/>
-              </a:schemeClr>
+              <a:schemeClr val="dk1"/>
             </a:solidFill>
-            <a:prstDash val="sysDot"/>
-            <a:tailEnd type="triangle"/>
+            <a:prstDash val="solid"/>
+            <a:round/>
+            <a:headEnd type="none" w="med" len="med"/>
+            <a:tailEnd type="arrow" w="med" len="med"/>
           </a:ln>
         </p:spPr>
         <p:style>
-          <a:lnRef idx="1">
-            <a:schemeClr val="accent1"/>
+          <a:lnRef idx="0">
+            <a:scrgbClr r="0" g="0" b="0"/>
           </a:lnRef>
           <a:fillRef idx="0">
-            <a:schemeClr val="accent1"/>
+            <a:scrgbClr r="0" g="0" b="0"/>
           </a:fillRef>
           <a:effectRef idx="0">
-            <a:schemeClr val="accent1"/>
+            <a:scrgbClr r="0" g="0" b="0"/>
           </a:effectRef>
           <a:fontRef idx="minor">
             <a:schemeClr val="tx1"/>
@@ -6233,26 +6305,25 @@
           <a:prstGeom prst="straightConnector1">
             <a:avLst/>
           </a:prstGeom>
-          <a:ln w="57150">
+          <a:ln w="9525" cap="flat" cmpd="sng" algn="ctr">
             <a:solidFill>
-              <a:schemeClr val="tx1">
-                <a:lumMod val="50000"/>
-                <a:lumOff val="50000"/>
-              </a:schemeClr>
+              <a:schemeClr val="dk1"/>
             </a:solidFill>
-            <a:prstDash val="sysDot"/>
-            <a:tailEnd type="triangle"/>
+            <a:prstDash val="solid"/>
+            <a:round/>
+            <a:headEnd type="none" w="med" len="med"/>
+            <a:tailEnd type="arrow" w="med" len="med"/>
           </a:ln>
         </p:spPr>
         <p:style>
-          <a:lnRef idx="1">
-            <a:schemeClr val="accent1"/>
+          <a:lnRef idx="0">
+            <a:scrgbClr r="0" g="0" b="0"/>
           </a:lnRef>
           <a:fillRef idx="0">
-            <a:schemeClr val="accent1"/>
+            <a:scrgbClr r="0" g="0" b="0"/>
           </a:fillRef>
           <a:effectRef idx="0">
-            <a:schemeClr val="accent1"/>
+            <a:scrgbClr r="0" g="0" b="0"/>
           </a:effectRef>
           <a:fontRef idx="minor">
             <a:schemeClr val="tx1"/>
@@ -6317,12 +6388,13 @@
         </p:nvSpPr>
         <p:spPr>
           <a:xfrm>
-            <a:off x="1980159" y="5123906"/>
-            <a:ext cx="1864250" cy="1489649"/>
+            <a:off x="1738739" y="5123906"/>
+            <a:ext cx="2549482" cy="1124563"/>
           </a:xfrm>
           <a:prstGeom prst="ellipse">
             <a:avLst/>
           </a:prstGeom>
+          <a:noFill/>
         </p:spPr>
         <p:style>
           <a:lnRef idx="2">
@@ -6346,32 +6418,25 @@
           <a:p>
             <a:pPr algn="ctr"/>
             <a:r>
-              <a:rPr lang="en-US" altLang="zh-CN" b="1" i="1" dirty="0" err="1">
-                <a:latin typeface="Arial" panose="020B0604020202020204" pitchFamily="34" charset="0"/>
-                <a:cs typeface="Arial" panose="020B0604020202020204" pitchFamily="34" charset="0"/>
+              <a:rPr lang="zh-CN" altLang="en-US">
+                <a:solidFill>
+                  <a:schemeClr val="tx1"/>
+                </a:solidFill>
               </a:rPr>
-              <a:t>CloudSim</a:t>
-            </a:r>
-            <a:r>
-              <a:rPr lang="en-US" altLang="zh-CN" b="1" i="1" dirty="0">
-                <a:latin typeface="Arial" panose="020B0604020202020204" pitchFamily="34" charset="0"/>
-                <a:cs typeface="Arial" panose="020B0604020202020204" pitchFamily="34" charset="0"/>
-              </a:rPr>
-              <a:t>:</a:t>
-            </a:r>
-          </a:p>
-          <a:p>
-            <a:pPr algn="ctr"/>
-            <a:r>
-              <a:rPr lang="en-US" altLang="zh-CN" b="1" i="1" dirty="0">
-                <a:latin typeface="Arial" panose="020B0604020202020204" pitchFamily="34" charset="0"/>
-                <a:cs typeface="Arial" panose="020B0604020202020204" pitchFamily="34" charset="0"/>
+              <a:t>调用容器</a:t>
+            </a:r>
+            <a:r>
+              <a:rPr lang="en-US" altLang="zh-CN" dirty="0">
+                <a:solidFill>
+                  <a:schemeClr val="tx1"/>
+                </a:solidFill>
               </a:rPr>
               <a:t>Allocation Policy</a:t>
             </a:r>
-            <a:endParaRPr lang="zh-CN" altLang="en-US" b="1" i="1" dirty="0">
-              <a:latin typeface="Arial" panose="020B0604020202020204" pitchFamily="34" charset="0"/>
-              <a:cs typeface="Arial" panose="020B0604020202020204" pitchFamily="34" charset="0"/>
+            <a:endParaRPr lang="zh-CN" altLang="en-US" dirty="0">
+              <a:solidFill>
+                <a:schemeClr val="tx1"/>
+              </a:solidFill>
             </a:endParaRPr>
           </a:p>
         </p:txBody>
@@ -6392,18 +6457,104 @@
         </p:nvCxnSpPr>
         <p:spPr>
           <a:xfrm>
-            <a:off x="7983585" y="5763026"/>
+            <a:off x="6739806" y="4939240"/>
             <a:ext cx="813573" cy="0"/>
+          </a:xfrm>
+          <a:prstGeom prst="straightConnector1">
+            <a:avLst/>
+          </a:prstGeom>
+          <a:ln w="9525" cap="flat" cmpd="sng" algn="ctr">
+            <a:solidFill>
+              <a:schemeClr val="dk1"/>
+            </a:solidFill>
+            <a:prstDash val="solid"/>
+            <a:round/>
+            <a:headEnd type="none" w="med" len="med"/>
+            <a:tailEnd type="arrow" w="med" len="med"/>
+          </a:ln>
+        </p:spPr>
+        <p:style>
+          <a:lnRef idx="0">
+            <a:scrgbClr r="0" g="0" b="0"/>
+          </a:lnRef>
+          <a:fillRef idx="0">
+            <a:scrgbClr r="0" g="0" b="0"/>
+          </a:fillRef>
+          <a:effectRef idx="0">
+            <a:scrgbClr r="0" g="0" b="0"/>
+          </a:effectRef>
+          <a:fontRef idx="minor">
+            <a:schemeClr val="tx1"/>
+          </a:fontRef>
+        </p:style>
+      </p:cxnSp>
+      <p:sp>
+        <p:nvSpPr>
+          <p:cNvPr id="52" name="文本框 51">
+            <a:extLst>
+              <a:ext uri="{FF2B5EF4-FFF2-40B4-BE49-F238E27FC236}">
+                <a16:creationId xmlns:a16="http://schemas.microsoft.com/office/drawing/2014/main" id="{577513E4-B06E-48DF-BB2A-7774690992CF}"/>
+              </a:ext>
+            </a:extLst>
+          </p:cNvPr>
+          <p:cNvSpPr txBox="1"/>
+          <p:nvPr/>
+        </p:nvSpPr>
+        <p:spPr>
+          <a:xfrm>
+            <a:off x="7553379" y="4754574"/>
+            <a:ext cx="1569660" cy="369332"/>
+          </a:xfrm>
+          <a:prstGeom prst="rect">
+            <a:avLst/>
+          </a:prstGeom>
+          <a:noFill/>
+        </p:spPr>
+        <p:txBody>
+          <a:bodyPr wrap="none" rtlCol="0">
+            <a:spAutoFit/>
+          </a:bodyPr>
+          <a:lstStyle/>
+          <a:p>
+            <a:r>
+              <a:rPr lang="zh-CN" altLang="en-US" b="1" dirty="0">
+                <a:solidFill>
+                  <a:schemeClr val="tx1">
+                    <a:lumMod val="65000"/>
+                    <a:lumOff val="35000"/>
+                  </a:schemeClr>
+                </a:solidFill>
+              </a:rPr>
+              <a:t>获取最新信息</a:t>
+            </a:r>
+          </a:p>
+        </p:txBody>
+      </p:sp>
+      <p:cxnSp>
+        <p:nvCxnSpPr>
+          <p:cNvPr id="53" name="直接箭头连接符 52">
+            <a:extLst>
+              <a:ext uri="{FF2B5EF4-FFF2-40B4-BE49-F238E27FC236}">
+                <a16:creationId xmlns:a16="http://schemas.microsoft.com/office/drawing/2014/main" id="{EF438435-2DB1-4675-9A02-B79543B218B1}"/>
+              </a:ext>
+            </a:extLst>
+          </p:cNvPr>
+          <p:cNvCxnSpPr>
+            <a:cxnSpLocks/>
+          </p:cNvCxnSpPr>
+          <p:nvPr/>
+        </p:nvCxnSpPr>
+        <p:spPr>
+          <a:xfrm>
+            <a:off x="3876199" y="3562922"/>
+            <a:ext cx="1149417" cy="1585384"/>
           </a:xfrm>
           <a:prstGeom prst="straightConnector1">
             <a:avLst/>
           </a:prstGeom>
           <a:ln w="57150">
             <a:solidFill>
-              <a:schemeClr val="tx1">
-                <a:lumMod val="50000"/>
-                <a:lumOff val="50000"/>
-              </a:schemeClr>
+              <a:schemeClr val="tx1"/>
             </a:solidFill>
             <a:prstDash val="sysDot"/>
             <a:tailEnd type="triangle"/>
@@ -6426,10 +6577,10 @@
       </p:cxnSp>
       <p:sp>
         <p:nvSpPr>
-          <p:cNvPr id="52" name="文本框 51">
-            <a:extLst>
-              <a:ext uri="{FF2B5EF4-FFF2-40B4-BE49-F238E27FC236}">
-                <a16:creationId xmlns:a16="http://schemas.microsoft.com/office/drawing/2014/main" id="{577513E4-B06E-48DF-BB2A-7774690992CF}"/>
+          <p:cNvPr id="56" name="文本框 55">
+            <a:extLst>
+              <a:ext uri="{FF2B5EF4-FFF2-40B4-BE49-F238E27FC236}">
+                <a16:creationId xmlns:a16="http://schemas.microsoft.com/office/drawing/2014/main" id="{093C0D70-AB0E-4F2E-A7E3-BB0B5CDDA731}"/>
               </a:ext>
             </a:extLst>
           </p:cNvPr>
@@ -6438,8 +6589,8 @@
         </p:nvSpPr>
         <p:spPr>
           <a:xfrm>
-            <a:off x="8797158" y="5578360"/>
-            <a:ext cx="3243196" cy="369332"/>
+            <a:off x="2105606" y="3829021"/>
+            <a:ext cx="1149417" cy="646331"/>
           </a:xfrm>
           <a:prstGeom prst="rect">
             <a:avLst/>
@@ -6454,32 +6605,33 @@
           <a:p>
             <a:r>
               <a:rPr lang="en-US" altLang="zh-CN" b="1" dirty="0">
-                <a:solidFill>
-                  <a:schemeClr val="tx1">
-                    <a:lumMod val="65000"/>
-                    <a:lumOff val="35000"/>
-                  </a:schemeClr>
-                </a:solidFill>
+                <a:latin typeface="Calibri" panose="020F0502020204030204" pitchFamily="34" charset="0"/>
+                <a:cs typeface="Calibri" panose="020F0502020204030204" pitchFamily="34" charset="0"/>
               </a:rPr>
-              <a:t>Obtain the latest information</a:t>
+              <a:t>Container</a:t>
+            </a:r>
+          </a:p>
+          <a:p>
+            <a:r>
+              <a:rPr lang="en-US" altLang="zh-CN" b="1" dirty="0">
+                <a:latin typeface="Calibri" panose="020F0502020204030204" pitchFamily="34" charset="0"/>
+                <a:cs typeface="Calibri" panose="020F0502020204030204" pitchFamily="34" charset="0"/>
+              </a:rPr>
+              <a:t>Allocation</a:t>
             </a:r>
             <a:endParaRPr lang="zh-CN" altLang="en-US" b="1" dirty="0">
-              <a:solidFill>
-                <a:schemeClr val="tx1">
-                  <a:lumMod val="65000"/>
-                  <a:lumOff val="35000"/>
-                </a:schemeClr>
-              </a:solidFill>
+              <a:latin typeface="Calibri" panose="020F0502020204030204" pitchFamily="34" charset="0"/>
+              <a:cs typeface="Calibri" panose="020F0502020204030204" pitchFamily="34" charset="0"/>
             </a:endParaRPr>
           </a:p>
         </p:txBody>
       </p:sp>
       <p:cxnSp>
         <p:nvCxnSpPr>
-          <p:cNvPr id="53" name="直接箭头连接符 52">
-            <a:extLst>
-              <a:ext uri="{FF2B5EF4-FFF2-40B4-BE49-F238E27FC236}">
-                <a16:creationId xmlns:a16="http://schemas.microsoft.com/office/drawing/2014/main" id="{EF438435-2DB1-4675-9A02-B79543B218B1}"/>
+          <p:cNvPr id="59" name="直接箭头连接符 58">
+            <a:extLst>
+              <a:ext uri="{FF2B5EF4-FFF2-40B4-BE49-F238E27FC236}">
+                <a16:creationId xmlns:a16="http://schemas.microsoft.com/office/drawing/2014/main" id="{CE64CADE-C394-4BEC-BEE3-611DF47BAA77}"/>
               </a:ext>
             </a:extLst>
           </p:cNvPr>
@@ -6490,15 +6642,15 @@
         </p:nvCxnSpPr>
         <p:spPr>
           <a:xfrm>
-            <a:off x="3876199" y="3562922"/>
-            <a:ext cx="1210196" cy="1714662"/>
+            <a:off x="3165810" y="3557703"/>
+            <a:ext cx="0" cy="1566203"/>
           </a:xfrm>
           <a:prstGeom prst="straightConnector1">
             <a:avLst/>
           </a:prstGeom>
           <a:ln w="57150">
             <a:solidFill>
-              <a:srgbClr val="00B050"/>
+              <a:schemeClr val="tx1"/>
             </a:solidFill>
             <a:prstDash val="sysDot"/>
             <a:tailEnd type="triangle"/>
@@ -6521,102 +6673,6 @@
       </p:cxnSp>
       <p:sp>
         <p:nvSpPr>
-          <p:cNvPr id="56" name="文本框 55">
-            <a:extLst>
-              <a:ext uri="{FF2B5EF4-FFF2-40B4-BE49-F238E27FC236}">
-                <a16:creationId xmlns:a16="http://schemas.microsoft.com/office/drawing/2014/main" id="{093C0D70-AB0E-4F2E-A7E3-BB0B5CDDA731}"/>
-              </a:ext>
-            </a:extLst>
-          </p:cNvPr>
-          <p:cNvSpPr txBox="1"/>
-          <p:nvPr/>
-        </p:nvSpPr>
-        <p:spPr>
-          <a:xfrm>
-            <a:off x="2105606" y="3829021"/>
-            <a:ext cx="1149417" cy="646331"/>
-          </a:xfrm>
-          <a:prstGeom prst="rect">
-            <a:avLst/>
-          </a:prstGeom>
-          <a:noFill/>
-        </p:spPr>
-        <p:txBody>
-          <a:bodyPr wrap="none" rtlCol="0">
-            <a:spAutoFit/>
-          </a:bodyPr>
-          <a:lstStyle/>
-          <a:p>
-            <a:r>
-              <a:rPr lang="en-US" altLang="zh-CN" b="1" dirty="0">
-                <a:latin typeface="Calibri" panose="020F0502020204030204" pitchFamily="34" charset="0"/>
-                <a:cs typeface="Calibri" panose="020F0502020204030204" pitchFamily="34" charset="0"/>
-              </a:rPr>
-              <a:t>Container</a:t>
-            </a:r>
-          </a:p>
-          <a:p>
-            <a:r>
-              <a:rPr lang="en-US" altLang="zh-CN" b="1" dirty="0">
-                <a:latin typeface="Calibri" panose="020F0502020204030204" pitchFamily="34" charset="0"/>
-                <a:cs typeface="Calibri" panose="020F0502020204030204" pitchFamily="34" charset="0"/>
-              </a:rPr>
-              <a:t>Allocation</a:t>
-            </a:r>
-            <a:endParaRPr lang="zh-CN" altLang="en-US" b="1" dirty="0">
-              <a:latin typeface="Calibri" panose="020F0502020204030204" pitchFamily="34" charset="0"/>
-              <a:cs typeface="Calibri" panose="020F0502020204030204" pitchFamily="34" charset="0"/>
-            </a:endParaRPr>
-          </a:p>
-        </p:txBody>
-      </p:sp>
-      <p:cxnSp>
-        <p:nvCxnSpPr>
-          <p:cNvPr id="59" name="直接箭头连接符 58">
-            <a:extLst>
-              <a:ext uri="{FF2B5EF4-FFF2-40B4-BE49-F238E27FC236}">
-                <a16:creationId xmlns:a16="http://schemas.microsoft.com/office/drawing/2014/main" id="{CE64CADE-C394-4BEC-BEE3-611DF47BAA77}"/>
-              </a:ext>
-            </a:extLst>
-          </p:cNvPr>
-          <p:cNvCxnSpPr>
-            <a:cxnSpLocks/>
-          </p:cNvCxnSpPr>
-          <p:nvPr/>
-        </p:nvCxnSpPr>
-        <p:spPr>
-          <a:xfrm>
-            <a:off x="3165810" y="3557703"/>
-            <a:ext cx="0" cy="1566203"/>
-          </a:xfrm>
-          <a:prstGeom prst="straightConnector1">
-            <a:avLst/>
-          </a:prstGeom>
-          <a:ln w="57150">
-            <a:solidFill>
-              <a:srgbClr val="00B050"/>
-            </a:solidFill>
-            <a:prstDash val="sysDot"/>
-            <a:tailEnd type="triangle"/>
-          </a:ln>
-        </p:spPr>
-        <p:style>
-          <a:lnRef idx="1">
-            <a:schemeClr val="accent1"/>
-          </a:lnRef>
-          <a:fillRef idx="0">
-            <a:schemeClr val="accent1"/>
-          </a:fillRef>
-          <a:effectRef idx="0">
-            <a:schemeClr val="accent1"/>
-          </a:effectRef>
-          <a:fontRef idx="minor">
-            <a:schemeClr val="tx1"/>
-          </a:fontRef>
-        </p:style>
-      </p:cxnSp>
-      <p:sp>
-        <p:nvSpPr>
           <p:cNvPr id="61" name="文本框 60">
             <a:extLst>
               <a:ext uri="{FF2B5EF4-FFF2-40B4-BE49-F238E27FC236}">
@@ -6671,12 +6727,13 @@
         </p:nvSpPr>
         <p:spPr>
           <a:xfrm>
-            <a:off x="4468278" y="5277584"/>
-            <a:ext cx="1864250" cy="970885"/>
+            <a:off x="4657462" y="5123906"/>
+            <a:ext cx="1864250" cy="1124563"/>
           </a:xfrm>
           <a:prstGeom prst="ellipse">
             <a:avLst/>
           </a:prstGeom>
+          <a:noFill/>
         </p:spPr>
         <p:style>
           <a:lnRef idx="2">
@@ -6700,26 +6757,13 @@
           <a:p>
             <a:pPr algn="ctr"/>
             <a:r>
-              <a:rPr lang="en-US" altLang="zh-CN" b="1" i="1" dirty="0">
-                <a:latin typeface="Arial" panose="020B0604020202020204" pitchFamily="34" charset="0"/>
-                <a:cs typeface="Arial" panose="020B0604020202020204" pitchFamily="34" charset="0"/>
+              <a:rPr lang="zh-CN" altLang="en-US" dirty="0">
+                <a:solidFill>
+                  <a:schemeClr val="tx1"/>
+                </a:solidFill>
               </a:rPr>
-              <a:t>Select</a:t>
-            </a:r>
-          </a:p>
-          <a:p>
-            <a:pPr algn="ctr"/>
-            <a:r>
-              <a:rPr lang="en-US" altLang="zh-CN" b="1" i="1" dirty="0" err="1">
-                <a:latin typeface="Arial" panose="020B0604020202020204" pitchFamily="34" charset="0"/>
-                <a:cs typeface="Arial" panose="020B0604020202020204" pitchFamily="34" charset="0"/>
-              </a:rPr>
-              <a:t>MinUsagecontainer</a:t>
-            </a:r>
-            <a:endParaRPr lang="zh-CN" altLang="en-US" b="1" i="1" dirty="0">
-              <a:latin typeface="Arial" panose="020B0604020202020204" pitchFamily="34" charset="0"/>
-              <a:cs typeface="Arial" panose="020B0604020202020204" pitchFamily="34" charset="0"/>
-            </a:endParaRPr>
+              <a:t>负载均衡做选择</a:t>
+            </a:r>
           </a:p>
         </p:txBody>
       </p:sp>

</xml_diff>